<commit_message>
meta learning final update
</commit_message>
<xml_diff>
--- a/exercises/meta_learning/meta_learning_exercise.pptx
+++ b/exercises/meta_learning/meta_learning_exercise.pptx
@@ -414,7 +414,7 @@
             <a:fld id="{57AF82F7-3B33-6D48-9626-CABC5CBE1A55}" type="datetime1">
               <a:rPr lang="it-IT" altLang="x-none"/>
               <a:pPr/>
-              <a:t>24/06/25</a:t>
+              <a:t>29/06/25</a:t>
             </a:fld>
             <a:endParaRPr lang="it-IT" altLang="x-none"/>
           </a:p>
@@ -3293,11 +3293,11 @@
                 <a14:m>
                   <m:oMath xmlns:m="http://schemas.openxmlformats.org/officeDocument/2006/math">
                     <m:r>
-                      <a:rPr lang="en-CH" i="1" smtClean="0">
+                      <a:rPr lang="el-GR" i="1" dirty="0" smtClean="0">
                         <a:latin typeface="Cambria Math" panose="02040503050406030204" pitchFamily="18" charset="0"/>
                         <a:ea typeface="Cambria Math" panose="02040503050406030204" pitchFamily="18" charset="0"/>
                       </a:rPr>
-                      <m:t>𝜃</m:t>
+                      <m:t>𝜙</m:t>
                     </m:r>
                   </m:oMath>
                 </a14:m>
@@ -3507,10 +3507,10 @@
       </p:sp>
       <p:pic>
         <p:nvPicPr>
-          <p:cNvPr id="3" name="Picture 2" descr="\documentclass{article}&#10;\usepackage{amsmath}&#10;\usepackage{amsfonts}&#10;\usepackage{color}&#10;\newcommand{\red}[1]{{\color{red}#1}}&#10;&#10;\pagestyle{empty}&#10;&#10;\begin{document}&#10;&#10;\begin{align*}&#10;\phi &amp;= \mathrm{Alg}_\theta(D) = \theta - \alpha \nabla_\theta \mathcal{L}(\theta, D), \\&#10;\hat y &amp;= \mathrm{MLP}_\phi(x).&#10;\end{align*}&#10;&#10;\end{document}" title="IguanaTex Bitmap Display">
+          <p:cNvPr id="4" name="Picture 3" descr="\documentclass{article}&#10;\usepackage{amsmath}&#10;\usepackage{amsfonts}&#10;\usepackage{color}&#10;\newcommand{\red}[1]{{\color{red}#1}}&#10;&#10;\pagestyle{empty}&#10;&#10;\begin{document}&#10;&#10;\begin{align*}&#10;\theta &amp;= \mathrm{Alg}_\theta(D) = \phi - \alpha \nabla_\theta \mathcal{L}(\theta, D), \\&#10;\hat y &amp;= \mathrm{MLP}_\phi(x).&#10;\end{align*}&#10;&#10;\end{document}" title="IguanaTex Bitmap Display">
             <a:extLst>
               <a:ext uri="{FF2B5EF4-FFF2-40B4-BE49-F238E27FC236}">
-                <a16:creationId xmlns:a16="http://schemas.microsoft.com/office/drawing/2014/main" id="{A7B78BE5-E467-332B-B686-DB5C2B63BE64}"/>
+                <a16:creationId xmlns:a16="http://schemas.microsoft.com/office/drawing/2014/main" id="{061ED360-403D-52F4-7B11-BEDDDF083981}"/>
               </a:ext>
             </a:extLst>
           </p:cNvPr>
@@ -3532,7 +3532,7 @@
         <p:spPr>
           <a:xfrm>
             <a:off x="4151784" y="2584891"/>
-            <a:ext cx="3177540" cy="594360"/>
+            <a:ext cx="3200400" cy="594360"/>
           </a:xfrm>
           <a:prstGeom prst="rect">
             <a:avLst/>
@@ -3541,10 +3541,10 @@
       </p:pic>
       <p:pic>
         <p:nvPicPr>
-          <p:cNvPr id="25" name="Picture 24" descr="\documentclass{article}&#10;\usepackage{amsmath}&#10;\usepackage{amsfonts}&#10;\usepackage{color}&#10;\newcommand{\red}[1]{{\color{red}#1}}&#10;&#10;\pagestyle{empty}&#10;&#10;\begin{document}&#10;&#10;$$J(\theta) = \sum_{i=1}^b \mathcal{L} (\mathrm{Alg}_\theta(D^{\rm tr}_i), D^{\rm te}_i)$$&#10;&#10;\end{document}" title="IguanaTex Bitmap Display">
+          <p:cNvPr id="8" name="Picture 7" descr="\documentclass{article}&#10;\usepackage{amsmath}&#10;\usepackage{amsfonts}&#10;\usepackage{color}&#10;\newcommand{\red}[1]{{\color{red}#1}}&#10;&#10;\pagestyle{empty}&#10;&#10;\begin{document}&#10;&#10;$$J(\phi) = \sum_{i=1}^b \mathcal{L} (\mathrm{Alg}_\phi(D^{\rm tr}_i), D^{\rm te}_i)$$&#10;&#10;\end{document}" title="IguanaTex Bitmap Display">
             <a:extLst>
               <a:ext uri="{FF2B5EF4-FFF2-40B4-BE49-F238E27FC236}">
-                <a16:creationId xmlns:a16="http://schemas.microsoft.com/office/drawing/2014/main" id="{094C962D-1DC1-4ED3-CE09-40EB20FDEC4F}"/>
+                <a16:creationId xmlns:a16="http://schemas.microsoft.com/office/drawing/2014/main" id="{BEA0FDBE-8972-C264-B660-22F798C2E18D}"/>
               </a:ext>
             </a:extLst>
           </p:cNvPr>
@@ -3566,13 +3566,79 @@
         <p:spPr>
           <a:xfrm>
             <a:off x="4367808" y="4725144"/>
-            <a:ext cx="2857500" cy="662940"/>
+            <a:ext cx="2880360" cy="662940"/>
           </a:xfrm>
           <a:prstGeom prst="rect">
             <a:avLst/>
           </a:prstGeom>
         </p:spPr>
       </p:pic>
+      <p:sp>
+        <p:nvSpPr>
+          <p:cNvPr id="10" name="TextBox 9">
+            <a:extLst>
+              <a:ext uri="{FF2B5EF4-FFF2-40B4-BE49-F238E27FC236}">
+                <a16:creationId xmlns:a16="http://schemas.microsoft.com/office/drawing/2014/main" id="{8FF0BA9F-14FD-197A-40CB-DBB50349BC42}"/>
+              </a:ext>
+            </a:extLst>
+          </p:cNvPr>
+          <p:cNvSpPr txBox="1"/>
+          <p:nvPr/>
+        </p:nvSpPr>
+        <p:spPr bwMode="auto">
+          <a:xfrm>
+            <a:off x="623392" y="5836842"/>
+            <a:ext cx="8280920" cy="461665"/>
+          </a:xfrm>
+          <a:prstGeom prst="rect">
+            <a:avLst/>
+          </a:prstGeom>
+          <a:noFill/>
+          <a:ln w="9525">
+            <a:noFill/>
+            <a:miter lim="800000"/>
+            <a:headEnd/>
+            <a:tailEnd/>
+          </a:ln>
+        </p:spPr>
+        <p:txBody>
+          <a:bodyPr wrap="square">
+            <a:spAutoFit/>
+          </a:bodyPr>
+          <a:lstStyle/>
+          <a:p>
+            <a:pPr eaLnBrk="0" hangingPunct="0">
+              <a:spcBef>
+                <a:spcPct val="20000"/>
+              </a:spcBef>
+            </a:pPr>
+            <a:r>
+              <a:rPr lang="en-GB" sz="1200" dirty="0"/>
+              <a:t>Finn, Chelsea, Pieter </a:t>
+            </a:r>
+            <a:r>
+              <a:rPr lang="en-GB" sz="1200" dirty="0" err="1"/>
+              <a:t>Abbeel</a:t>
+            </a:r>
+            <a:r>
+              <a:rPr lang="en-GB" sz="1200" dirty="0"/>
+              <a:t>, and Sergey Levine. "Model-agnostic meta-learning for fast adaptation of deep networks.”</a:t>
+            </a:r>
+            <a:br>
+              <a:rPr lang="en-GB" sz="1200" dirty="0"/>
+            </a:br>
+            <a:r>
+              <a:rPr lang="en-GB" sz="1200" dirty="0"/>
+              <a:t>International conference on machine learning. PMLR, 2017.</a:t>
+            </a:r>
+            <a:endParaRPr lang="en-CH" sz="1100" kern="0" dirty="0">
+              <a:latin typeface="+mn-lt"/>
+              <a:ea typeface="ＭＳ Ｐゴシック" pitchFamily="-112" charset="-128"/>
+              <a:cs typeface="ＭＳ Ｐゴシック" pitchFamily="-112" charset="-128"/>
+            </a:endParaRPr>
+          </a:p>
+        </p:txBody>
+      </p:sp>
     </p:spTree>
     <p:extLst>
       <p:ext uri="{BB962C8B-B14F-4D97-AF65-F5344CB8AC3E}">
@@ -4105,7 +4171,7 @@
               <a:p>
                 <a:r>
                   <a:rPr lang="en-CH" dirty="0"/>
-                  <a:t>In most meta learning algorithm, each dataset </a:t>
+                  <a:t>Each dataset </a:t>
                 </a:r>
                 <a14:m>
                   <m:oMath xmlns:m="http://schemas.openxmlformats.org/officeDocument/2006/math">
@@ -4359,15 +4425,33 @@
                                   </p:childTnLst>
                                 </p:cTn>
                               </p:par>
+                            </p:childTnLst>
+                          </p:cTn>
+                        </p:par>
+                      </p:childTnLst>
+                    </p:cTn>
+                  </p:par>
+                  <p:par>
+                    <p:cTn id="7" fill="hold">
+                      <p:stCondLst>
+                        <p:cond delay="indefinite"/>
+                      </p:stCondLst>
+                      <p:childTnLst>
+                        <p:par>
+                          <p:cTn id="8" fill="hold">
+                            <p:stCondLst>
+                              <p:cond delay="0"/>
+                            </p:stCondLst>
+                            <p:childTnLst>
                               <p:par>
-                                <p:cTn id="7" presetID="1" presetClass="entr" presetSubtype="0" fill="hold" nodeType="withEffect">
+                                <p:cTn id="9" presetID="1" presetClass="entr" presetSubtype="0" fill="hold" nodeType="clickEffect">
                                   <p:stCondLst>
                                     <p:cond delay="0"/>
                                   </p:stCondLst>
                                   <p:childTnLst>
                                     <p:set>
                                       <p:cBhvr>
-                                        <p:cTn id="8" dur="1" fill="hold">
+                                        <p:cTn id="10" dur="1" fill="hold">
                                           <p:stCondLst>
                                             <p:cond delay="0"/>
                                           </p:stCondLst>
@@ -4391,14 +4475,14 @@
                                 </p:cTn>
                               </p:par>
                               <p:par>
-                                <p:cTn id="9" presetID="1" presetClass="entr" presetSubtype="0" fill="hold" nodeType="withEffect">
+                                <p:cTn id="11" presetID="1" presetClass="entr" presetSubtype="0" fill="hold" nodeType="withEffect">
                                   <p:stCondLst>
                                     <p:cond delay="0"/>
                                   </p:stCondLst>
                                   <p:childTnLst>
                                     <p:set>
                                       <p:cBhvr>
-                                        <p:cTn id="10" dur="1" fill="hold">
+                                        <p:cTn id="12" dur="1" fill="hold">
                                           <p:stCondLst>
                                             <p:cond delay="0"/>
                                           </p:stCondLst>
@@ -4803,10 +4887,10 @@
       </mc:AlternateContent>
       <p:pic>
         <p:nvPicPr>
-          <p:cNvPr id="4" name="Picture 3" descr="\documentclass{article}&#10;\usepackage{amsmath}&#10;\usepackage{amsfonts}&#10;\usepackage{color}&#10;\newcommand{\red}[1]{{\color{red}#1}}&#10;&#10;\pagestyle{empty}&#10;&#10;\begin{document}&#10;&#10;\begin{equation*}&#10;\hat y = \mathcal{M}_\theta(x, D)&#10;\end{equation*}&#10;&#10;\end{document}" title="IguanaTex Bitmap Display">
+          <p:cNvPr id="3" name="Picture 2" descr="\documentclass{article}&#10;\usepackage{amsmath}&#10;\usepackage{amsfonts}&#10;\usepackage{color}&#10;\newcommand{\red}[1]{{\color{red}#1}}&#10;&#10;\pagestyle{empty}&#10;&#10;\begin{document}&#10;&#10;\begin{equation*}&#10;\hat y = \mathcal{M}_\phi(x, D)&#10;\end{equation*}&#10;&#10;\end{document}" title="IguanaTex Bitmap Display">
             <a:extLst>
               <a:ext uri="{FF2B5EF4-FFF2-40B4-BE49-F238E27FC236}">
-                <a16:creationId xmlns:a16="http://schemas.microsoft.com/office/drawing/2014/main" id="{AD3E1C3F-8A70-D528-68EC-4EC60CFE45D7}"/>
+                <a16:creationId xmlns:a16="http://schemas.microsoft.com/office/drawing/2014/main" id="{B9960EDE-D4DF-6339-463A-D43D223FA755}"/>
               </a:ext>
             </a:extLst>
           </p:cNvPr>
@@ -4828,7 +4912,7 @@
         <p:spPr>
           <a:xfrm>
             <a:off x="3575720" y="1936815"/>
-            <a:ext cx="1371600" cy="228600"/>
+            <a:ext cx="1394460" cy="251460"/>
           </a:xfrm>
           <a:prstGeom prst="rect">
             <a:avLst/>
@@ -4837,10 +4921,10 @@
       </p:pic>
       <p:pic>
         <p:nvPicPr>
-          <p:cNvPr id="7" name="Picture 6" descr="\documentclass{article}&#10;\usepackage{amsmath}&#10;\usepackage{amsfonts}&#10;\usepackage{color}&#10;\newcommand{\red}[1]{{\color{red}#1}}&#10;&#10;\pagestyle{empty}&#10;&#10;\begin{document}&#10;&#10;$$J(\theta) = \sum_{i=1}^b \sum_{j=1}^K \ell(y^{\rm te}_{i,j}, \mathcal{M}(D^{\rm tr}_i, x^{\rm te}_{i,j})).$$&#10;&#10;&#10;\end{document}" title="IguanaTex Bitmap Display">
+          <p:cNvPr id="13" name="Picture 12" descr="\documentclass{article}&#10;\usepackage{amsmath}&#10;\usepackage{amsfonts}&#10;\usepackage{color}&#10;\newcommand{\red}[1]{{\color{red}#1}}&#10;&#10;\pagestyle{empty}&#10;&#10;\begin{document}&#10;&#10;$$J(\phi) = \sum_{i=1}^b \sum_{j=1}^K \mathcal{L}(y^{\rm te}_{i,j}, \mathcal{M}_\phi(D^{\rm tr}_i, x^{\rm te}_{i,j})).$$&#10;&#10;&#10;\end{document}" title="IguanaTex Bitmap Display">
             <a:extLst>
               <a:ext uri="{FF2B5EF4-FFF2-40B4-BE49-F238E27FC236}">
-                <a16:creationId xmlns:a16="http://schemas.microsoft.com/office/drawing/2014/main" id="{BC98AAD5-1748-EB44-9CF4-360E66E762E9}"/>
+                <a16:creationId xmlns:a16="http://schemas.microsoft.com/office/drawing/2014/main" id="{4106785D-8E60-4FFE-91BF-C94562F139AE}"/>
               </a:ext>
             </a:extLst>
           </p:cNvPr>
@@ -4862,7 +4946,7 @@
         <p:spPr>
           <a:xfrm>
             <a:off x="4007768" y="4797152"/>
-            <a:ext cx="3451860" cy="708660"/>
+            <a:ext cx="3657600" cy="708660"/>
           </a:xfrm>
           <a:prstGeom prst="rect">
             <a:avLst/>
@@ -4993,7 +5077,7 @@
                                           </p:stCondLst>
                                         </p:cTn>
                                         <p:tgtEl>
-                                          <p:spTgt spid="7"/>
+                                          <p:spTgt spid="13"/>
                                         </p:tgtEl>
                                         <p:attrNameLst>
                                           <p:attrName>style.visibility</p:attrName>
@@ -5245,7 +5329,7 @@
                 <a:ext cx="10920784" cy="1749694"/>
               </a:xfrm>
               <a:blipFill>
-                <a:blip r:embed="rId14"/>
+                <a:blip r:embed="rId15"/>
                 <a:stretch>
                   <a:fillRect l="-1163" t="-4317"/>
                 </a:stretch>
@@ -5268,10 +5352,10 @@
       </mc:AlternateContent>
       <p:pic>
         <p:nvPicPr>
-          <p:cNvPr id="11" name="Picture 10" descr="\documentclass{article}&#10;\usepackage{amsmath}&#10;\usepackage{amsfonts}&#10;\usepackage{color}&#10;\newcommand{\red}[1]{{\color{red}#1}}&#10;&#10;\pagestyle{empty}&#10;&#10;\begin{document}&#10;&#10;\begin{equation*}&#10;\hat y = \mathcal{M}_\theta(D, x)&#10;\end{equation*}&#10;&#10;\end{document}" title="IguanaTex Bitmap Display">
+          <p:cNvPr id="3" name="Picture 2" descr="\documentclass{article}&#10;\usepackage{amsmath}&#10;\usepackage{amsfonts}&#10;\usepackage{color}&#10;\newcommand{\red}[1]{{\color{red}#1}}&#10;&#10;\pagestyle{empty}&#10;&#10;\begin{document}&#10;&#10;\begin{equation*}&#10;\hat y = \mathcal{M}_\phi(D, x)&#10;\end{equation*}&#10;&#10;\end{document}" title="IguanaTex Bitmap Display">
             <a:extLst>
               <a:ext uri="{FF2B5EF4-FFF2-40B4-BE49-F238E27FC236}">
-                <a16:creationId xmlns:a16="http://schemas.microsoft.com/office/drawing/2014/main" id="{0C56ADFF-C3FD-715C-9558-F12FE846927A}"/>
+                <a16:creationId xmlns:a16="http://schemas.microsoft.com/office/drawing/2014/main" id="{9709CE00-D820-3E24-DA53-5D1E16DF8073}"/>
               </a:ext>
             </a:extLst>
           </p:cNvPr>
@@ -5285,7 +5369,7 @@
           </p:nvPr>
         </p:nvPicPr>
         <p:blipFill>
-          <a:blip r:embed="rId15"/>
+          <a:blip r:embed="rId16"/>
           <a:stretch>
             <a:fillRect/>
           </a:stretch>
@@ -5293,7 +5377,7 @@
         <p:spPr>
           <a:xfrm>
             <a:off x="2495600" y="1928047"/>
-            <a:ext cx="1371600" cy="228600"/>
+            <a:ext cx="1394460" cy="251460"/>
           </a:xfrm>
           <a:prstGeom prst="rect">
             <a:avLst/>
@@ -5302,10 +5386,10 @@
       </p:pic>
       <p:pic>
         <p:nvPicPr>
-          <p:cNvPr id="22" name="Picture 21" descr="\documentclass{article}&#10;\usepackage{amsmath}&#10;\usepackage{amsfonts}&#10;\usepackage{color}&#10;\newcommand{\red}[1]{{\color{red}#1}}&#10;&#10;\pagestyle{empty}&#10;&#10;\begin{document}&#10;&#10;&#10;\begin{align*}&#10;c &amp;= \mathrm{DeepSet}_{\theta}(D) \\&#10;\hat y &amp;= \mathrm{MLP}_\theta(c, x).&#10;\end{align*}&#10;\end{document}" title="IguanaTex Bitmap Display">
+          <p:cNvPr id="9" name="Picture 8" descr="\documentclass{article}&#10;\usepackage{amsmath}&#10;\usepackage{amsfonts}&#10;\usepackage{color}&#10;\newcommand{\red}[1]{{\color{red}#1}}&#10;&#10;\pagestyle{empty}&#10;&#10;\begin{document}&#10;&#10;&#10;\begin{align*}&#10;c &amp;= \mathrm{DeepSet}_{\phi_1}(D) \\&#10;\hat y &amp;= \mathrm{MLP}_{\phi_2}(c, x).&#10;\end{align*}&#10;\end{document}" title="IguanaTex Bitmap Display">
             <a:extLst>
               <a:ext uri="{FF2B5EF4-FFF2-40B4-BE49-F238E27FC236}">
-                <a16:creationId xmlns:a16="http://schemas.microsoft.com/office/drawing/2014/main" id="{AA2A32F8-B5F0-97BE-7D82-9DE05AF6FC33}"/>
+                <a16:creationId xmlns:a16="http://schemas.microsoft.com/office/drawing/2014/main" id="{4F62ABE8-ECFA-1CBA-5F55-F2722D026A99}"/>
               </a:ext>
             </a:extLst>
           </p:cNvPr>
@@ -5319,7 +5403,7 @@
           </p:nvPr>
         </p:nvPicPr>
         <p:blipFill>
-          <a:blip r:embed="rId16"/>
+          <a:blip r:embed="rId17"/>
           <a:stretch>
             <a:fillRect/>
           </a:stretch>
@@ -5327,7 +5411,7 @@
         <p:spPr>
           <a:xfrm>
             <a:off x="839416" y="2420888"/>
-            <a:ext cx="1691640" cy="571500"/>
+            <a:ext cx="1805940" cy="617220"/>
           </a:xfrm>
           <a:prstGeom prst="rect">
             <a:avLst/>
@@ -5353,7 +5437,7 @@
           </p:nvPr>
         </p:nvPicPr>
         <p:blipFill>
-          <a:blip r:embed="rId17"/>
+          <a:blip r:embed="rId18"/>
           <a:stretch>
             <a:fillRect/>
           </a:stretch>
@@ -5387,7 +5471,7 @@
           </p:nvPr>
         </p:nvPicPr>
         <p:blipFill>
-          <a:blip r:embed="rId18"/>
+          <a:blip r:embed="rId19"/>
           <a:stretch>
             <a:fillRect/>
           </a:stretch>
@@ -5421,14 +5505,14 @@
           </p:nvPr>
         </p:nvPicPr>
         <p:blipFill>
-          <a:blip r:embed="rId19"/>
+          <a:blip r:embed="rId20"/>
           <a:stretch>
             <a:fillRect/>
           </a:stretch>
         </p:blipFill>
         <p:spPr>
           <a:xfrm>
-            <a:off x="2305499" y="6041297"/>
+            <a:off x="2316929" y="5604961"/>
             <a:ext cx="822960" cy="228600"/>
           </a:xfrm>
           <a:prstGeom prst="rect">
@@ -5455,14 +5539,14 @@
           </p:nvPr>
         </p:nvPicPr>
         <p:blipFill>
-          <a:blip r:embed="rId20"/>
+          <a:blip r:embed="rId21"/>
           <a:stretch>
             <a:fillRect/>
           </a:stretch>
         </p:blipFill>
         <p:spPr>
           <a:xfrm>
-            <a:off x="4468807" y="3847889"/>
+            <a:off x="4434304" y="3847889"/>
             <a:ext cx="182880" cy="137160"/>
           </a:xfrm>
           <a:prstGeom prst="rect">
@@ -5664,7 +5748,7 @@
           </p:nvPr>
         </p:nvPicPr>
         <p:blipFill>
-          <a:blip r:embed="rId21"/>
+          <a:blip r:embed="rId22"/>
           <a:stretch>
             <a:fillRect/>
           </a:stretch>
@@ -5698,14 +5782,14 @@
           </p:nvPr>
         </p:nvPicPr>
         <p:blipFill>
-          <a:blip r:embed="rId22"/>
+          <a:blip r:embed="rId23"/>
           <a:stretch>
             <a:fillRect/>
           </a:stretch>
         </p:blipFill>
         <p:spPr>
           <a:xfrm>
-            <a:off x="4419860" y="5661946"/>
+            <a:off x="4375589" y="5707339"/>
             <a:ext cx="251460" cy="137160"/>
           </a:xfrm>
           <a:prstGeom prst="rect">
@@ -6048,14 +6132,14 @@
           </p:nvPr>
         </p:nvPicPr>
         <p:blipFill>
-          <a:blip r:embed="rId23"/>
+          <a:blip r:embed="rId24"/>
           <a:stretch>
             <a:fillRect/>
           </a:stretch>
         </p:blipFill>
         <p:spPr>
           <a:xfrm>
-            <a:off x="2705549" y="5406662"/>
+            <a:off x="2705549" y="5307445"/>
             <a:ext cx="22860" cy="205740"/>
           </a:xfrm>
           <a:prstGeom prst="rect">
@@ -6504,7 +6588,7 @@
           </p:nvPr>
         </p:nvPicPr>
         <p:blipFill>
-          <a:blip r:embed="rId24"/>
+          <a:blip r:embed="rId25"/>
           <a:stretch>
             <a:fillRect/>
           </a:stretch>
@@ -6710,7 +6794,7 @@
           </p:nvPr>
         </p:nvPicPr>
         <p:blipFill>
-          <a:blip r:embed="rId25"/>
+          <a:blip r:embed="rId26"/>
           <a:stretch>
             <a:fillRect/>
           </a:stretch>
@@ -6744,7 +6828,7 @@
           </p:nvPr>
         </p:nvPicPr>
         <p:blipFill>
-          <a:blip r:embed="rId26"/>
+          <a:blip r:embed="rId27"/>
           <a:stretch>
             <a:fillRect/>
           </a:stretch>
@@ -6753,6 +6837,40 @@
           <a:xfrm>
             <a:off x="8704268" y="5362714"/>
             <a:ext cx="114300" cy="114300"/>
+          </a:xfrm>
+          <a:prstGeom prst="rect">
+            <a:avLst/>
+          </a:prstGeom>
+        </p:spPr>
+      </p:pic>
+      <p:pic>
+        <p:nvPicPr>
+          <p:cNvPr id="10" name="Picture 9" descr="\documentclass{article}&#10;\usepackage{amsmath}&#10;\usepackage{amsfonts}&#10;\usepackage{color}&#10;\newcommand{\red}[1]{{\color{red}#1}}&#10;&#10;\pagestyle{empty}&#10;&#10;\begin{document}&#10;&#10;$$&#10;\vdots&#10;$$&#10;&#10;\end{document}" title="IguanaTex Bitmap Display">
+            <a:extLst>
+              <a:ext uri="{FF2B5EF4-FFF2-40B4-BE49-F238E27FC236}">
+                <a16:creationId xmlns:a16="http://schemas.microsoft.com/office/drawing/2014/main" id="{2E25A023-46A1-AB14-712F-0F19B1811395}"/>
+              </a:ext>
+            </a:extLst>
+          </p:cNvPr>
+          <p:cNvPicPr>
+            <a:picLocks noChangeAspect="1"/>
+          </p:cNvPicPr>
+          <p:nvPr>
+            <p:custDataLst>
+              <p:tags r:id="rId13"/>
+            </p:custDataLst>
+          </p:nvPr>
+        </p:nvPicPr>
+        <p:blipFill>
+          <a:blip r:embed="rId24"/>
+          <a:stretch>
+            <a:fillRect/>
+          </a:stretch>
+        </p:blipFill>
+        <p:spPr>
+          <a:xfrm>
+            <a:off x="4514314" y="5307445"/>
+            <a:ext cx="22860" cy="205740"/>
           </a:xfrm>
           <a:prstGeom prst="rect">
             <a:avLst/>
@@ -7307,10 +7425,10 @@
       </p:cxnSp>
       <p:pic>
         <p:nvPicPr>
-          <p:cNvPr id="24" name="Picture 23" descr="\documentclass{article}&#10;\usepackage{amsmath}&#10;\usepackage{amsfonts}&#10;\usepackage{color}&#10;\newcommand{\red}[1]{{\color{red}#1}}&#10;&#10;\pagestyle{empty}&#10;&#10;\begin{document}&#10;&#10;$$&#10;\hat y_{m+1:N} = \mathcal{M}_\theta(u_{m+1:N}, u_{1:m}, y_{1:m}) &#10;$$&#10;&#10;\end{document}" title="IguanaTex Bitmap Display">
+          <p:cNvPr id="7" name="Picture 6" descr="\documentclass{article}&#10;\usepackage{amsmath}&#10;\usepackage{amsfonts}&#10;\usepackage{color}&#10;\newcommand{\red}[1]{{\color{red}#1}}&#10;&#10;\pagestyle{empty}&#10;&#10;\begin{document}&#10;&#10;$$&#10;\hat y_{m+1:N} = \mathcal{M}_\phi(u_{m+1:N}, u_{1:m}, y_{1:m}) &#10;$$&#10;&#10;\end{document}" title="IguanaTex Bitmap Display">
             <a:extLst>
               <a:ext uri="{FF2B5EF4-FFF2-40B4-BE49-F238E27FC236}">
-                <a16:creationId xmlns:a16="http://schemas.microsoft.com/office/drawing/2014/main" id="{A46EDE5C-7DE5-0B9C-65B8-5E80D6F14835}"/>
+                <a16:creationId xmlns:a16="http://schemas.microsoft.com/office/drawing/2014/main" id="{CAF41B3F-A81B-1DB8-61EC-0EE50C046FF7}"/>
               </a:ext>
             </a:extLst>
           </p:cNvPr>
@@ -7332,7 +7450,7 @@
         <p:spPr>
           <a:xfrm>
             <a:off x="7104112" y="2780928"/>
-            <a:ext cx="3383280" cy="228600"/>
+            <a:ext cx="3406140" cy="251460"/>
           </a:xfrm>
           <a:prstGeom prst="rect">
             <a:avLst/>
@@ -7474,6 +7592,32 @@
               <a:rPr lang="en-CH" dirty="0"/>
               <a:t>Use it to tackle the meta learning exercise (meta_learning_exercise.ipynb)</a:t>
             </a:r>
+          </a:p>
+          <a:p>
+            <a:endParaRPr lang="en-CH" dirty="0"/>
+          </a:p>
+          <a:p>
+            <a:r>
+              <a:rPr lang="en-CH" dirty="0"/>
+              <a:t>Optionally, apply hyper-networks and MAML (sketched in </a:t>
+            </a:r>
+            <a:r>
+              <a:rPr lang="en-GB" dirty="0" err="1"/>
+              <a:t>maml_hypernet_sketch.ipynb</a:t>
+            </a:r>
+            <a:r>
+              <a:rPr lang="en-GB" dirty="0"/>
+              <a:t>, described </a:t>
+            </a:r>
+            <a:r>
+              <a:rPr lang="en-GB"/>
+              <a:t>in the </a:t>
+            </a:r>
+            <a:r>
+              <a:rPr lang="en-CH"/>
+              <a:t>next slides…)</a:t>
+            </a:r>
+            <a:endParaRPr lang="en-CH" dirty="0"/>
           </a:p>
           <a:p>
             <a:pPr marL="0" indent="0">
@@ -7776,10 +7920,10 @@
       </mc:AlternateContent>
       <p:pic>
         <p:nvPicPr>
-          <p:cNvPr id="32" name="Picture 31" descr="\documentclass{article}&#10;\usepackage{amsmath}&#10;\usepackage{amsfonts}&#10;\usepackage{color}&#10;\newcommand{\red}[1]{{\color{red}#1}}&#10;&#10;\pagestyle{empty}&#10;&#10;\begin{document}&#10;&#10;&#10;\begin{align*}&#10;\phi &amp;= \mathrm{DeepSet}_\theta(D) \\&#10;\hat y &amp;= \mathrm{MLP}_\phi(x).&#10;\end{align*}&#10;\end{document}" title="IguanaTex Bitmap Display">
+          <p:cNvPr id="3" name="Picture 2" descr="\documentclass{article}&#10;\usepackage{amsmath}&#10;\usepackage{amsfonts}&#10;\usepackage{color}&#10;\newcommand{\red}[1]{{\color{red}#1}}&#10;&#10;\pagestyle{empty}&#10;&#10;\begin{document}&#10;&#10;&#10;\begin{align*}&#10;\theta &amp;= \mathrm{DeepSet}_\phi(D) \\&#10;\hat y &amp;= \mathrm{MLP}_\theta(x).&#10;\end{align*}&#10;\end{document}" title="IguanaTex Bitmap Display">
             <a:extLst>
               <a:ext uri="{FF2B5EF4-FFF2-40B4-BE49-F238E27FC236}">
-                <a16:creationId xmlns:a16="http://schemas.microsoft.com/office/drawing/2014/main" id="{236A380F-6467-3C52-8D86-CFCE898835CD}"/>
+                <a16:creationId xmlns:a16="http://schemas.microsoft.com/office/drawing/2014/main" id="{E23B0DC5-0F7E-FCFE-8980-405F6C7C36D5}"/>
               </a:ext>
             </a:extLst>
           </p:cNvPr>
@@ -8962,10 +9106,10 @@
       </p:cxnSp>
       <p:pic>
         <p:nvPicPr>
-          <p:cNvPr id="30" name="Picture 29" descr="\documentclass{article}&#10;\usepackage{amsmath}&#10;\usepackage{amsfonts}&#10;\usepackage{color}&#10;\newcommand{\red}[1]{{\color{red}#1}}&#10;&#10;\pagestyle{empty}&#10;&#10;\begin{document}&#10;&#10;$$&#10;\phi = \{W_1, b_1, \dots\}&#10;$$&#10;\end{document}" title="IguanaTex Bitmap Display">
+          <p:cNvPr id="7" name="Picture 6" descr="\documentclass{article}&#10;\usepackage{amsmath}&#10;\usepackage{amsfonts}&#10;\usepackage{color}&#10;\newcommand{\red}[1]{{\color{red}#1}}&#10;&#10;\pagestyle{empty}&#10;&#10;\begin{document}&#10;&#10;$$&#10;\theta = \{W_1, b_1, \dots\}&#10;$$&#10;\end{document}" title="IguanaTex Bitmap Display">
             <a:extLst>
               <a:ext uri="{FF2B5EF4-FFF2-40B4-BE49-F238E27FC236}">
-                <a16:creationId xmlns:a16="http://schemas.microsoft.com/office/drawing/2014/main" id="{63E6CB8F-1A20-D1C9-EEE3-39C69BAF2794}"/>
+                <a16:creationId xmlns:a16="http://schemas.microsoft.com/office/drawing/2014/main" id="{3AE0552B-8EE6-0BE1-3449-FDE78713853C}"/>
               </a:ext>
             </a:extLst>
           </p:cNvPr>
@@ -8987,7 +9131,7 @@
         <p:spPr>
           <a:xfrm>
             <a:off x="7871612" y="3376455"/>
-            <a:ext cx="1668780" cy="228600"/>
+            <a:ext cx="1645920" cy="228600"/>
           </a:xfrm>
           <a:prstGeom prst="rect">
             <a:avLst/>
@@ -9500,18 +9644,18 @@
 <file path=ppt/tags/tag19.xml><?xml version="1.0" encoding="utf-8"?>
 <p:tagLst xmlns:a="http://schemas.openxmlformats.org/drawingml/2006/main" xmlns:r="http://schemas.openxmlformats.org/officeDocument/2006/relationships" xmlns:p="http://schemas.openxmlformats.org/presentationml/2006/main">
   <p:tag name="OUTPUTDPI" val="1200"/>
-  <p:tag name="ORIGINALHEIGHT" val="10"/>
-  <p:tag name="ORIGINALWIDTH" val="148"/>
+  <p:tag name="ORIGINALHEIGHT" val="9"/>
+  <p:tag name="ORIGINALWIDTH" val="1"/>
   <p:tag name="OUTPUTTYPE" val="PDF"/>
   <p:tag name="IGUANATEXVERSION" val="160"/>
-  <p:tag name="LATEXADDIN" val="\documentclass{article}&#10;\usepackage{amsmath}&#10;\usepackage{amsfonts}&#10;\usepackage{color}&#10;\newcommand{\red}[1]{{\color{red}#1}}&#10;&#10;\pagestyle{empty}&#10;&#10;\begin{document}&#10;&#10;$$&#10;\hat y_{m+1:N} = \mathcal{M}_\theta(u_{m+1:N}, u_{1:m}, y_{1:m}) &#10;$$&#10;&#10;\end{document}"/>
+  <p:tag name="LATEXADDIN" val="\documentclass{article}&#10;\usepackage{amsmath}&#10;\usepackage{amsfonts}&#10;\usepackage{color}&#10;\newcommand{\red}[1]{{\color{red}#1}}&#10;&#10;\pagestyle{empty}&#10;&#10;\begin{document}&#10;&#10;$$&#10;\vdots&#10;$$&#10;&#10;\end{document}"/>
   <p:tag name="IGUANATEXSIZE" val="18"/>
-  <p:tag name="IGUANATEXCURSOR" val="164"/>
+  <p:tag name="IGUANATEXCURSOR" val="171"/>
   <p:tag name="TRANSPARENCY" val="True"/>
   <p:tag name="LATEXENGINEID" val="0"/>
   <p:tag name="TEMPFOLDER" val="/Users/marco.forgione/Library/Containers/com.microsoft.Powerpoint/Data/tmp/TemporaryItems/"/>
-  <p:tag name="LATEXFORMHEIGHT" val="501"/>
-  <p:tag name="LATEXFORMWIDTH" val="820"/>
+  <p:tag name="LATEXFORMHEIGHT" val="426.65"/>
+  <p:tag name="LATEXFORMWIDTH" val="513.35"/>
   <p:tag name="LATEXFORMWRAP" val="True"/>
   <p:tag name="BITMAPVECTOR" val="0"/>
 </p:tagLst>
@@ -9540,13 +9684,33 @@
 <file path=ppt/tags/tag20.xml><?xml version="1.0" encoding="utf-8"?>
 <p:tagLst xmlns:a="http://schemas.openxmlformats.org/drawingml/2006/main" xmlns:r="http://schemas.openxmlformats.org/officeDocument/2006/relationships" xmlns:p="http://schemas.openxmlformats.org/presentationml/2006/main">
   <p:tag name="OUTPUTDPI" val="1200"/>
+  <p:tag name="ORIGINALHEIGHT" val="11"/>
+  <p:tag name="ORIGINALWIDTH" val="149"/>
+  <p:tag name="OUTPUTTYPE" val="PDF"/>
+  <p:tag name="IGUANATEXVERSION" val="160"/>
+  <p:tag name="LATEXADDIN" val="\documentclass{article}&#10;\usepackage{amsmath}&#10;\usepackage{amsfonts}&#10;\usepackage{color}&#10;\newcommand{\red}[1]{{\color{red}#1}}&#10;&#10;\pagestyle{empty}&#10;&#10;\begin{document}&#10;&#10;$$&#10;\hat y_{m+1:N} = \mathcal{M}_\phi(u_{m+1:N}, u_{1:m}, y_{1:m}) &#10;$$&#10;&#10;\end{document}"/>
+  <p:tag name="IGUANATEXSIZE" val="18"/>
+  <p:tag name="IGUANATEXCURSOR" val="198"/>
+  <p:tag name="TRANSPARENCY" val="True"/>
+  <p:tag name="LATEXENGINEID" val="0"/>
+  <p:tag name="TEMPFOLDER" val="/Users/marco.forgione/Library/Containers/com.microsoft.Powerpoint/Data/tmp/TemporaryItems/"/>
+  <p:tag name="LATEXFORMHEIGHT" val="501"/>
+  <p:tag name="LATEXFORMWIDTH" val="820"/>
+  <p:tag name="LATEXFORMWRAP" val="True"/>
+  <p:tag name="BITMAPVECTOR" val="0"/>
+</p:tagLst>
+</file>
+
+<file path=ppt/tags/tag21.xml><?xml version="1.0" encoding="utf-8"?>
+<p:tagLst xmlns:a="http://schemas.openxmlformats.org/drawingml/2006/main" xmlns:r="http://schemas.openxmlformats.org/officeDocument/2006/relationships" xmlns:p="http://schemas.openxmlformats.org/presentationml/2006/main">
+  <p:tag name="OUTPUTDPI" val="1200"/>
   <p:tag name="ORIGINALHEIGHT" val="26"/>
   <p:tag name="ORIGINALWIDTH" val="75"/>
   <p:tag name="OUTPUTTYPE" val="PDF"/>
   <p:tag name="IGUANATEXVERSION" val="160"/>
-  <p:tag name="LATEXADDIN" val="\documentclass{article}&#10;\usepackage{amsmath}&#10;\usepackage{amsfonts}&#10;\usepackage{color}&#10;\newcommand{\red}[1]{{\color{red}#1}}&#10;&#10;\pagestyle{empty}&#10;&#10;\begin{document}&#10;&#10;&#10;\begin{align*}&#10;\phi &amp;= \mathrm{DeepSet}_\theta(D) \\&#10;\hat y &amp;= \mathrm{MLP}_\phi(x).&#10;\end{align*}&#10;\end{document}"/>
+  <p:tag name="LATEXADDIN" val="\documentclass{article}&#10;\usepackage{amsmath}&#10;\usepackage{amsfonts}&#10;\usepackage{color}&#10;\newcommand{\red}[1]{{\color{red}#1}}&#10;&#10;\pagestyle{empty}&#10;&#10;\begin{document}&#10;&#10;&#10;\begin{align*}&#10;\theta &amp;= \mathrm{DeepSet}_\phi(D) \\&#10;\hat y &amp;= \mathrm{MLP}_\theta(x).&#10;\end{align*}&#10;\end{document}"/>
   <p:tag name="IGUANATEXSIZE" val="18"/>
-  <p:tag name="IGUANATEXCURSOR" val="209"/>
+  <p:tag name="IGUANATEXCURSOR" val="245"/>
   <p:tag name="TRANSPARENCY" val="True"/>
   <p:tag name="LATEXENGINEID" val="0"/>
   <p:tag name="TEMPFOLDER" val="/Users/marco.forgione/Library/Containers/com.microsoft.Powerpoint/Data/tmp/TemporaryItems/"/>
@@ -9557,7 +9721,7 @@
 </p:tagLst>
 </file>
 
-<file path=ppt/tags/tag21.xml><?xml version="1.0" encoding="utf-8"?>
+<file path=ppt/tags/tag22.xml><?xml version="1.0" encoding="utf-8"?>
 <p:tagLst xmlns:a="http://schemas.openxmlformats.org/drawingml/2006/main" xmlns:r="http://schemas.openxmlformats.org/officeDocument/2006/relationships" xmlns:p="http://schemas.openxmlformats.org/presentationml/2006/main">
   <p:tag name="OUTPUTDPI" val="1200"/>
   <p:tag name="ORIGINALHEIGHT" val="10"/>
@@ -9577,7 +9741,7 @@
 </p:tagLst>
 </file>
 
-<file path=ppt/tags/tag22.xml><?xml version="1.0" encoding="utf-8"?>
+<file path=ppt/tags/tag23.xml><?xml version="1.0" encoding="utf-8"?>
 <p:tagLst xmlns:a="http://schemas.openxmlformats.org/drawingml/2006/main" xmlns:r="http://schemas.openxmlformats.org/officeDocument/2006/relationships" xmlns:p="http://schemas.openxmlformats.org/presentationml/2006/main">
   <p:tag name="OUTPUTDPI" val="1200"/>
   <p:tag name="ORIGINALHEIGHT" val="10"/>
@@ -9597,7 +9761,7 @@
 </p:tagLst>
 </file>
 
-<file path=ppt/tags/tag23.xml><?xml version="1.0" encoding="utf-8"?>
+<file path=ppt/tags/tag24.xml><?xml version="1.0" encoding="utf-8"?>
 <p:tagLst xmlns:a="http://schemas.openxmlformats.org/drawingml/2006/main" xmlns:r="http://schemas.openxmlformats.org/officeDocument/2006/relationships" xmlns:p="http://schemas.openxmlformats.org/presentationml/2006/main">
   <p:tag name="OUTPUTDPI" val="1200"/>
   <p:tag name="ORIGINALHEIGHT" val="10"/>
@@ -9617,7 +9781,7 @@
 </p:tagLst>
 </file>
 
-<file path=ppt/tags/tag24.xml><?xml version="1.0" encoding="utf-8"?>
+<file path=ppt/tags/tag25.xml><?xml version="1.0" encoding="utf-8"?>
 <p:tagLst xmlns:a="http://schemas.openxmlformats.org/drawingml/2006/main" xmlns:r="http://schemas.openxmlformats.org/officeDocument/2006/relationships" xmlns:p="http://schemas.openxmlformats.org/presentationml/2006/main">
   <p:tag name="OUTPUTDPI" val="1200"/>
   <p:tag name="ORIGINALHEIGHT" val="6"/>
@@ -9637,7 +9801,7 @@
 </p:tagLst>
 </file>
 
-<file path=ppt/tags/tag25.xml><?xml version="1.0" encoding="utf-8"?>
+<file path=ppt/tags/tag26.xml><?xml version="1.0" encoding="utf-8"?>
 <p:tagLst xmlns:a="http://schemas.openxmlformats.org/drawingml/2006/main" xmlns:r="http://schemas.openxmlformats.org/officeDocument/2006/relationships" xmlns:p="http://schemas.openxmlformats.org/presentationml/2006/main">
   <p:tag name="OUTPUTDPI" val="1200"/>
   <p:tag name="ORIGINALHEIGHT" val="6"/>
@@ -9657,7 +9821,7 @@
 </p:tagLst>
 </file>
 
-<file path=ppt/tags/tag26.xml><?xml version="1.0" encoding="utf-8"?>
+<file path=ppt/tags/tag27.xml><?xml version="1.0" encoding="utf-8"?>
 <p:tagLst xmlns:a="http://schemas.openxmlformats.org/drawingml/2006/main" xmlns:r="http://schemas.openxmlformats.org/officeDocument/2006/relationships" xmlns:p="http://schemas.openxmlformats.org/presentationml/2006/main">
   <p:tag name="OUTPUTDPI" val="1200"/>
   <p:tag name="ORIGINALHEIGHT" val="6"/>
@@ -9677,7 +9841,7 @@
 </p:tagLst>
 </file>
 
-<file path=ppt/tags/tag27.xml><?xml version="1.0" encoding="utf-8"?>
+<file path=ppt/tags/tag28.xml><?xml version="1.0" encoding="utf-8"?>
 <p:tagLst xmlns:a="http://schemas.openxmlformats.org/drawingml/2006/main" xmlns:r="http://schemas.openxmlformats.org/officeDocument/2006/relationships" xmlns:p="http://schemas.openxmlformats.org/presentationml/2006/main">
   <p:tag name="OUTPUTDPI" val="1200"/>
   <p:tag name="ORIGINALHEIGHT" val="9"/>
@@ -9697,34 +9861,14 @@
 </p:tagLst>
 </file>
 
-<file path=ppt/tags/tag28.xml><?xml version="1.0" encoding="utf-8"?>
+<file path=ppt/tags/tag29.xml><?xml version="1.0" encoding="utf-8"?>
 <p:tagLst xmlns:a="http://schemas.openxmlformats.org/drawingml/2006/main" xmlns:r="http://schemas.openxmlformats.org/officeDocument/2006/relationships" xmlns:p="http://schemas.openxmlformats.org/presentationml/2006/main">
   <p:tag name="OUTPUTDPI" val="1200"/>
   <p:tag name="ORIGINALHEIGHT" val="10"/>
-  <p:tag name="ORIGINALWIDTH" val="73"/>
+  <p:tag name="ORIGINALWIDTH" val="72"/>
   <p:tag name="OUTPUTTYPE" val="PDF"/>
   <p:tag name="IGUANATEXVERSION" val="160"/>
-  <p:tag name="LATEXADDIN" val="\documentclass{article}&#10;\usepackage{amsmath}&#10;\usepackage{amsfonts}&#10;\usepackage{color}&#10;\newcommand{\red}[1]{{\color{red}#1}}&#10;&#10;\pagestyle{empty}&#10;&#10;\begin{document}&#10;&#10;$$&#10;\phi = \{W_1, b_1, \dots\}&#10;$$&#10;\end{document}"/>
-  <p:tag name="IGUANATEXSIZE" val="18"/>
-  <p:tag name="IGUANATEXCURSOR" val="170"/>
-  <p:tag name="TRANSPARENCY" val="True"/>
-  <p:tag name="LATEXENGINEID" val="0"/>
-  <p:tag name="TEMPFOLDER" val="/Users/marco.forgione/Library/Containers/com.microsoft.Powerpoint/Data/tmp/TemporaryItems/"/>
-  <p:tag name="LATEXFORMHEIGHT" val="426.65"/>
-  <p:tag name="LATEXFORMWIDTH" val="513.35"/>
-  <p:tag name="LATEXFORMWRAP" val="True"/>
-  <p:tag name="BITMAPVECTOR" val="0"/>
-</p:tagLst>
-</file>
-
-<file path=ppt/tags/tag29.xml><?xml version="1.0" encoding="utf-8"?>
-<p:tagLst xmlns:a="http://schemas.openxmlformats.org/drawingml/2006/main" xmlns:r="http://schemas.openxmlformats.org/officeDocument/2006/relationships" xmlns:p="http://schemas.openxmlformats.org/presentationml/2006/main">
-  <p:tag name="OUTPUTDPI" val="1200"/>
-  <p:tag name="ORIGINALHEIGHT" val="9"/>
-  <p:tag name="ORIGINALWIDTH" val="5"/>
-  <p:tag name="OUTPUTTYPE" val="PDF"/>
-  <p:tag name="IGUANATEXVERSION" val="160"/>
-  <p:tag name="LATEXADDIN" val="\documentclass{article}&#10;\usepackage{amsmath}&#10;\usepackage{amsfonts}&#10;\usepackage{color}&#10;\newcommand{\red}[1]{{\color{red}#1}}&#10;&#10;\pagestyle{empty}&#10;&#10;\begin{document}&#10;&#10;$$&#10;\hat y&#10;$$&#10;&#10;\end{document}"/>
+  <p:tag name="LATEXADDIN" val="\documentclass{article}&#10;\usepackage{amsmath}&#10;\usepackage{amsfonts}&#10;\usepackage{color}&#10;\newcommand{\red}[1]{{\color{red}#1}}&#10;&#10;\pagestyle{empty}&#10;&#10;\begin{document}&#10;&#10;$$&#10;\theta = \{W_1, b_1, \dots\}&#10;$$&#10;\end{document}"/>
   <p:tag name="IGUANATEXSIZE" val="18"/>
   <p:tag name="IGUANATEXCURSOR" val="171"/>
   <p:tag name="TRANSPARENCY" val="True"/>
@@ -9760,6 +9904,26 @@
 <file path=ppt/tags/tag30.xml><?xml version="1.0" encoding="utf-8"?>
 <p:tagLst xmlns:a="http://schemas.openxmlformats.org/drawingml/2006/main" xmlns:r="http://schemas.openxmlformats.org/officeDocument/2006/relationships" xmlns:p="http://schemas.openxmlformats.org/presentationml/2006/main">
   <p:tag name="OUTPUTDPI" val="1200"/>
+  <p:tag name="ORIGINALHEIGHT" val="9"/>
+  <p:tag name="ORIGINALWIDTH" val="5"/>
+  <p:tag name="OUTPUTTYPE" val="PDF"/>
+  <p:tag name="IGUANATEXVERSION" val="160"/>
+  <p:tag name="LATEXADDIN" val="\documentclass{article}&#10;\usepackage{amsmath}&#10;\usepackage{amsfonts}&#10;\usepackage{color}&#10;\newcommand{\red}[1]{{\color{red}#1}}&#10;&#10;\pagestyle{empty}&#10;&#10;\begin{document}&#10;&#10;$$&#10;\hat y&#10;$$&#10;&#10;\end{document}"/>
+  <p:tag name="IGUANATEXSIZE" val="18"/>
+  <p:tag name="IGUANATEXCURSOR" val="171"/>
+  <p:tag name="TRANSPARENCY" val="True"/>
+  <p:tag name="LATEXENGINEID" val="0"/>
+  <p:tag name="TEMPFOLDER" val="/Users/marco.forgione/Library/Containers/com.microsoft.Powerpoint/Data/tmp/TemporaryItems/"/>
+  <p:tag name="LATEXFORMHEIGHT" val="426.65"/>
+  <p:tag name="LATEXFORMWIDTH" val="513.35"/>
+  <p:tag name="LATEXFORMWRAP" val="True"/>
+  <p:tag name="BITMAPVECTOR" val="0"/>
+</p:tagLst>
+</file>
+
+<file path=ppt/tags/tag31.xml><?xml version="1.0" encoding="utf-8"?>
+<p:tagLst xmlns:a="http://schemas.openxmlformats.org/drawingml/2006/main" xmlns:r="http://schemas.openxmlformats.org/officeDocument/2006/relationships" xmlns:p="http://schemas.openxmlformats.org/presentationml/2006/main">
+  <p:tag name="OUTPUTDPI" val="1200"/>
   <p:tag name="ORIGINALHEIGHT" val="5"/>
   <p:tag name="ORIGINALWIDTH" val="5"/>
   <p:tag name="OUTPUTTYPE" val="PDF"/>
@@ -9777,16 +9941,16 @@
 </p:tagLst>
 </file>
 
-<file path=ppt/tags/tag31.xml><?xml version="1.0" encoding="utf-8"?>
+<file path=ppt/tags/tag32.xml><?xml version="1.0" encoding="utf-8"?>
 <p:tagLst xmlns:a="http://schemas.openxmlformats.org/drawingml/2006/main" xmlns:r="http://schemas.openxmlformats.org/officeDocument/2006/relationships" xmlns:p="http://schemas.openxmlformats.org/presentationml/2006/main">
   <p:tag name="OUTPUTDPI" val="1200"/>
   <p:tag name="ORIGINALHEIGHT" val="26"/>
-  <p:tag name="ORIGINALWIDTH" val="139"/>
+  <p:tag name="ORIGINALWIDTH" val="140"/>
   <p:tag name="OUTPUTTYPE" val="PDF"/>
   <p:tag name="IGUANATEXVERSION" val="160"/>
-  <p:tag name="LATEXADDIN" val="\documentclass{article}&#10;\usepackage{amsmath}&#10;\usepackage{amsfonts}&#10;\usepackage{color}&#10;\newcommand{\red}[1]{{\color{red}#1}}&#10;&#10;\pagestyle{empty}&#10;&#10;\begin{document}&#10;&#10;\begin{align*}&#10;\phi &amp;= \mathrm{Alg}_\theta(D) = \theta - \alpha \nabla_\theta \mathcal{L}(\theta, D), \\&#10;\hat y &amp;= \mathrm{MLP}_\phi(x).&#10;\end{align*}&#10;&#10;\end{document}"/>
+  <p:tag name="LATEXADDIN" val="\documentclass{article}&#10;\usepackage{amsmath}&#10;\usepackage{amsfonts}&#10;\usepackage{color}&#10;\newcommand{\red}[1]{{\color{red}#1}}&#10;&#10;\pagestyle{empty}&#10;&#10;\begin{document}&#10;&#10;\begin{align*}&#10;\theta &amp;= \mathrm{Alg}_\theta(D) = \phi - \alpha \nabla_\theta \mathcal{L}(\theta, D), \\&#10;\hat y &amp;= \mathrm{MLP}_\phi(x).&#10;\end{align*}&#10;&#10;\end{document}"/>
   <p:tag name="IGUANATEXSIZE" val="18"/>
-  <p:tag name="IGUANATEXCURSOR" val="239"/>
+  <p:tag name="IGUANATEXCURSOR" val="216"/>
   <p:tag name="TRANSPARENCY" val="True"/>
   <p:tag name="LATEXENGINEID" val="0"/>
   <p:tag name="TEMPFOLDER" val="/Users/marco.forgione/Library/Containers/com.microsoft.Powerpoint/Data/tmp/TemporaryItems/"/>
@@ -9797,16 +9961,16 @@
 </p:tagLst>
 </file>
 
-<file path=ppt/tags/tag32.xml><?xml version="1.0" encoding="utf-8"?>
+<file path=ppt/tags/tag33.xml><?xml version="1.0" encoding="utf-8"?>
 <p:tagLst xmlns:a="http://schemas.openxmlformats.org/drawingml/2006/main" xmlns:r="http://schemas.openxmlformats.org/officeDocument/2006/relationships" xmlns:p="http://schemas.openxmlformats.org/presentationml/2006/main">
   <p:tag name="OUTPUTDPI" val="1200"/>
   <p:tag name="ORIGINALHEIGHT" val="29"/>
-  <p:tag name="ORIGINALWIDTH" val="125"/>
+  <p:tag name="ORIGINALWIDTH" val="126"/>
   <p:tag name="OUTPUTTYPE" val="PDF"/>
   <p:tag name="IGUANATEXVERSION" val="160"/>
-  <p:tag name="LATEXADDIN" val="\documentclass{article}&#10;\usepackage{amsmath}&#10;\usepackage{amsfonts}&#10;\usepackage{color}&#10;\newcommand{\red}[1]{{\color{red}#1}}&#10;&#10;\pagestyle{empty}&#10;&#10;\begin{document}&#10;&#10;$$J(\theta) = \sum_{i=1}^b \mathcal{L} (\mathrm{Alg}_\theta(D^{\rm tr}_i), D^{\rm te}_i)$$&#10;&#10;\end{document}"/>
+  <p:tag name="LATEXADDIN" val="\documentclass{article}&#10;\usepackage{amsmath}&#10;\usepackage{amsfonts}&#10;\usepackage{color}&#10;\newcommand{\red}[1]{{\color{red}#1}}&#10;&#10;\pagestyle{empty}&#10;&#10;\begin{document}&#10;&#10;$$J(\phi) = \sum_{i=1}^b \mathcal{L} (\mathrm{Alg}_\phi(D^{\rm tr}_i), D^{\rm te}_i)$$&#10;&#10;\end{document}"/>
   <p:tag name="IGUANATEXSIZE" val="18"/>
-  <p:tag name="IGUANATEXCURSOR" val="250"/>
+  <p:tag name="IGUANATEXCURSOR" val="217"/>
   <p:tag name="TRANSPARENCY" val="True"/>
   <p:tag name="LATEXENGINEID" val="0"/>
   <p:tag name="TEMPFOLDER" val="/Users/marco.forgione/Library/Containers/com.microsoft.Powerpoint/Data/tmp/TemporaryItems/"/>
@@ -9840,13 +10004,13 @@
 <file path=ppt/tags/tag5.xml><?xml version="1.0" encoding="utf-8"?>
 <p:tagLst xmlns:a="http://schemas.openxmlformats.org/drawingml/2006/main" xmlns:r="http://schemas.openxmlformats.org/officeDocument/2006/relationships" xmlns:p="http://schemas.openxmlformats.org/presentationml/2006/main">
   <p:tag name="OUTPUTDPI" val="1200"/>
-  <p:tag name="ORIGINALHEIGHT" val="10"/>
-  <p:tag name="ORIGINALWIDTH" val="60"/>
+  <p:tag name="ORIGINALHEIGHT" val="11"/>
+  <p:tag name="ORIGINALWIDTH" val="61"/>
   <p:tag name="OUTPUTTYPE" val="PDF"/>
   <p:tag name="IGUANATEXVERSION" val="160"/>
-  <p:tag name="LATEXADDIN" val="\documentclass{article}&#10;\usepackage{amsmath}&#10;\usepackage{amsfonts}&#10;\usepackage{color}&#10;\newcommand{\red}[1]{{\color{red}#1}}&#10;&#10;\pagestyle{empty}&#10;&#10;\begin{document}&#10;&#10;\begin{equation*}&#10;\hat y = \mathcal{M}_\theta(x, D)&#10;\end{equation*}&#10;&#10;\end{document}"/>
+  <p:tag name="LATEXADDIN" val="\documentclass{article}&#10;\usepackage{amsmath}&#10;\usepackage{amsfonts}&#10;\usepackage{color}&#10;\newcommand{\red}[1]{{\color{red}#1}}&#10;&#10;\pagestyle{empty}&#10;&#10;\begin{document}&#10;&#10;\begin{equation*}&#10;\hat y = \mathcal{M}_\phi(x, D)&#10;\end{equation*}&#10;&#10;\end{document}"/>
   <p:tag name="IGUANATEXSIZE" val="18"/>
-  <p:tag name="IGUANATEXCURSOR" val="212"/>
+  <p:tag name="IGUANATEXCURSOR" val="205"/>
   <p:tag name="TRANSPARENCY" val="True"/>
   <p:tag name="LATEXENGINEID" val="0"/>
   <p:tag name="TEMPFOLDER" val="/Users/marco.forgione/Library/Containers/com.microsoft.Powerpoint/Data/tmp/TemporaryItems/"/>
@@ -9861,12 +10025,12 @@
 <p:tagLst xmlns:a="http://schemas.openxmlformats.org/drawingml/2006/main" xmlns:r="http://schemas.openxmlformats.org/officeDocument/2006/relationships" xmlns:p="http://schemas.openxmlformats.org/presentationml/2006/main">
   <p:tag name="OUTPUTDPI" val="1200"/>
   <p:tag name="ORIGINALHEIGHT" val="31"/>
-  <p:tag name="ORIGINALWIDTH" val="151"/>
+  <p:tag name="ORIGINALWIDTH" val="160"/>
   <p:tag name="OUTPUTTYPE" val="PDF"/>
   <p:tag name="IGUANATEXVERSION" val="160"/>
-  <p:tag name="LATEXADDIN" val="\documentclass{article}&#10;\usepackage{amsmath}&#10;\usepackage{amsfonts}&#10;\usepackage{color}&#10;\newcommand{\red}[1]{{\color{red}#1}}&#10;&#10;\pagestyle{empty}&#10;&#10;\begin{document}&#10;&#10;$$J(\theta) = \sum_{i=1}^b \sum_{j=1}^K \ell(y^{\rm te}_{i,j}, \mathcal{M}(D^{\rm tr}_i, x^{\rm te}_{i,j})).$$&#10;&#10;&#10;\end{document}"/>
+  <p:tag name="LATEXADDIN" val="\documentclass{article}&#10;\usepackage{amsmath}&#10;\usepackage{amsfonts}&#10;\usepackage{color}&#10;\newcommand{\red}[1]{{\color{red}#1}}&#10;&#10;\pagestyle{empty}&#10;&#10;\begin{document}&#10;&#10;$$J(\phi) = \sum_{i=1}^b \sum_{j=1}^K \mathcal{L}(y^{\rm te}_{i,j}, \mathcal{M}_\phi(D^{\rm tr}_i, x^{\rm te}_{i,j})).$$&#10;&#10;&#10;\end{document}"/>
   <p:tag name="IGUANATEXSIZE" val="18"/>
-  <p:tag name="IGUANATEXCURSOR" val="273"/>
+  <p:tag name="IGUANATEXCURSOR" val="211"/>
   <p:tag name="TRANSPARENCY" val="True"/>
   <p:tag name="LATEXENGINEID" val="0"/>
   <p:tag name="TEMPFOLDER" val="/Users/marco.forgione/Library/Containers/com.microsoft.Powerpoint/Data/tmp/TemporaryItems/"/>
@@ -9880,13 +10044,13 @@
 <file path=ppt/tags/tag7.xml><?xml version="1.0" encoding="utf-8"?>
 <p:tagLst xmlns:a="http://schemas.openxmlformats.org/drawingml/2006/main" xmlns:r="http://schemas.openxmlformats.org/officeDocument/2006/relationships" xmlns:p="http://schemas.openxmlformats.org/presentationml/2006/main">
   <p:tag name="OUTPUTDPI" val="1200"/>
-  <p:tag name="ORIGINALHEIGHT" val="10"/>
-  <p:tag name="ORIGINALWIDTH" val="60"/>
+  <p:tag name="ORIGINALHEIGHT" val="11"/>
+  <p:tag name="ORIGINALWIDTH" val="61"/>
   <p:tag name="OUTPUTTYPE" val="PDF"/>
   <p:tag name="IGUANATEXVERSION" val="160"/>
-  <p:tag name="LATEXADDIN" val="\documentclass{article}&#10;\usepackage{amsmath}&#10;\usepackage{amsfonts}&#10;\usepackage{color}&#10;\newcommand{\red}[1]{{\color{red}#1}}&#10;&#10;\pagestyle{empty}&#10;&#10;\begin{document}&#10;&#10;\begin{equation*}&#10;\hat y = \mathcal{M}_\theta(D, x)&#10;\end{equation*}&#10;&#10;\end{document}"/>
+  <p:tag name="LATEXADDIN" val="\documentclass{article}&#10;\usepackage{amsmath}&#10;\usepackage{amsfonts}&#10;\usepackage{color}&#10;\newcommand{\red}[1]{{\color{red}#1}}&#10;&#10;\pagestyle{empty}&#10;&#10;\begin{document}&#10;&#10;\begin{equation*}&#10;\hat y = \mathcal{M}_\phi(D, x)&#10;\end{equation*}&#10;&#10;\end{document}"/>
   <p:tag name="IGUANATEXSIZE" val="18"/>
-  <p:tag name="IGUANATEXCURSOR" val="207"/>
+  <p:tag name="IGUANATEXCURSOR" val="205"/>
   <p:tag name="TRANSPARENCY" val="True"/>
   <p:tag name="LATEXENGINEID" val="0"/>
   <p:tag name="TEMPFOLDER" val="/Users/marco.forgione/Library/Containers/com.microsoft.Powerpoint/Data/tmp/TemporaryItems/"/>
@@ -9900,13 +10064,13 @@
 <file path=ppt/tags/tag8.xml><?xml version="1.0" encoding="utf-8"?>
 <p:tagLst xmlns:a="http://schemas.openxmlformats.org/drawingml/2006/main" xmlns:r="http://schemas.openxmlformats.org/officeDocument/2006/relationships" xmlns:p="http://schemas.openxmlformats.org/presentationml/2006/main">
   <p:tag name="OUTPUTDPI" val="1200"/>
-  <p:tag name="ORIGINALHEIGHT" val="25"/>
-  <p:tag name="ORIGINALWIDTH" val="74"/>
+  <p:tag name="ORIGINALHEIGHT" val="27"/>
+  <p:tag name="ORIGINALWIDTH" val="79"/>
   <p:tag name="OUTPUTTYPE" val="PDF"/>
   <p:tag name="IGUANATEXVERSION" val="160"/>
-  <p:tag name="LATEXADDIN" val="\documentclass{article}&#10;\usepackage{amsmath}&#10;\usepackage{amsfonts}&#10;\usepackage{color}&#10;\newcommand{\red}[1]{{\color{red}#1}}&#10;&#10;\pagestyle{empty}&#10;&#10;\begin{document}&#10;&#10;&#10;\begin{align*}&#10;c &amp;= \mathrm{DeepSet}_{\theta}(D) \\&#10;\hat y &amp;= \mathrm{MLP}_\theta(c, x).&#10;\end{align*}&#10;\end{document}"/>
+  <p:tag name="LATEXADDIN" val="\documentclass{article}&#10;\usepackage{amsmath}&#10;\usepackage{amsfonts}&#10;\usepackage{color}&#10;\newcommand{\red}[1]{{\color{red}#1}}&#10;&#10;\pagestyle{empty}&#10;&#10;\begin{document}&#10;&#10;&#10;\begin{align*}&#10;c &amp;= \mathrm{DeepSet}_{\phi_1}(D) \\&#10;\hat y &amp;= \mathrm{MLP}_{\phi_2}(c, x).&#10;\end{align*}&#10;\end{document}"/>
   <p:tag name="IGUANATEXSIZE" val="18"/>
-  <p:tag name="IGUANATEXCURSOR" val="244"/>
+  <p:tag name="IGUANATEXCURSOR" val="245"/>
   <p:tag name="TRANSPARENCY" val="True"/>
   <p:tag name="LATEXENGINEID" val="0"/>
   <p:tag name="TEMPFOLDER" val="/Users/marco.forgione/Library/Containers/com.microsoft.Powerpoint/Data/tmp/TemporaryItems/"/>
@@ -11355,15 +11519,6 @@
 </file>
 
 <file path=customXml/item1.xml><?xml version="1.0" encoding="utf-8"?>
-<?mso-contentType ?>
-<FormTemplates xmlns="http://schemas.microsoft.com/sharepoint/v3/contenttype/forms">
-  <Display>DocumentLibraryForm</Display>
-  <Edit>DocumentLibraryForm</Edit>
-  <New>DocumentLibraryForm</New>
-</FormTemplates>
-</file>
-
-<file path=customXml/item2.xml><?xml version="1.0" encoding="utf-8"?>
 <ct:contentTypeSchema xmlns:ct="http://schemas.microsoft.com/office/2006/metadata/contentType" xmlns:ma="http://schemas.microsoft.com/office/2006/metadata/properties/metaAttributes" ct:_="" ma:_="" ma:contentTypeName="Document" ma:contentTypeID="0x010100E943B4D0C91CA54E9BBFAD215D4A4FF7" ma:contentTypeVersion="18" ma:contentTypeDescription="Create a new document." ma:contentTypeScope="" ma:versionID="48c4930ddcec7bff74490998dd84a4c1">
   <xsd:schema xmlns:xsd="http://www.w3.org/2001/XMLSchema" xmlns:xs="http://www.w3.org/2001/XMLSchema" xmlns:p="http://schemas.microsoft.com/office/2006/metadata/properties" xmlns:ns2="0c05fedb-ed2a-4eb3-93de-5f5a6c97bfe0" xmlns:ns3="c69d801c-64cd-49bc-b1b3-ec2496ede094" targetNamespace="http://schemas.microsoft.com/office/2006/metadata/properties" ma:root="true" ma:fieldsID="dcb337392c8a5973c5e221652a72fbb4" ns2:_="" ns3:_="">
     <xsd:import namespace="0c05fedb-ed2a-4eb3-93de-5f5a6c97bfe0"/>
@@ -11618,7 +11773,7 @@
 </ct:contentTypeSchema>
 </file>
 
-<file path=customXml/item3.xml><?xml version="1.0" encoding="utf-8"?>
+<file path=customXml/item2.xml><?xml version="1.0" encoding="utf-8"?>
 <p:properties xmlns:p="http://schemas.microsoft.com/office/2006/metadata/properties" xmlns:xsi="http://www.w3.org/2001/XMLSchema-instance" xmlns:pc="http://schemas.microsoft.com/office/infopath/2007/PartnerControls">
   <documentManagement>
     <lcf76f155ced4ddcb4097134ff3c332f xmlns="0c05fedb-ed2a-4eb3-93de-5f5a6c97bfe0">
@@ -11629,15 +11784,16 @@
 </p:properties>
 </file>
 
-<file path=customXml/itemProps1.xml><?xml version="1.0" encoding="utf-8"?>
-<ds:datastoreItem xmlns:ds="http://schemas.openxmlformats.org/officeDocument/2006/customXml" ds:itemID="{957E0BBE-38AF-4179-B401-F6E82B6A5F3D}">
-  <ds:schemaRefs>
-    <ds:schemaRef ds:uri="http://schemas.microsoft.com/sharepoint/v3/contenttype/forms"/>
-  </ds:schemaRefs>
-</ds:datastoreItem>
+<file path=customXml/item3.xml><?xml version="1.0" encoding="utf-8"?>
+<?mso-contentType ?>
+<FormTemplates xmlns="http://schemas.microsoft.com/sharepoint/v3/contenttype/forms">
+  <Display>DocumentLibraryForm</Display>
+  <Edit>DocumentLibraryForm</Edit>
+  <New>DocumentLibraryForm</New>
+</FormTemplates>
 </file>
 
-<file path=customXml/itemProps2.xml><?xml version="1.0" encoding="utf-8"?>
+<file path=customXml/itemProps1.xml><?xml version="1.0" encoding="utf-8"?>
 <ds:datastoreItem xmlns:ds="http://schemas.openxmlformats.org/officeDocument/2006/customXml" ds:itemID="{950C4CF8-8E6C-4481-8DE0-79509E1800D4}">
   <ds:schemaRefs>
     <ds:schemaRef ds:uri="http://schemas.microsoft.com/office/2006/metadata/contentType"/>
@@ -11656,7 +11812,7 @@
 </ds:datastoreItem>
 </file>
 
-<file path=customXml/itemProps3.xml><?xml version="1.0" encoding="utf-8"?>
+<file path=customXml/itemProps2.xml><?xml version="1.0" encoding="utf-8"?>
 <ds:datastoreItem xmlns:ds="http://schemas.openxmlformats.org/officeDocument/2006/customXml" ds:itemID="{862A9E72-43F2-4CCE-8F90-EBA4919DBB42}">
   <ds:schemaRefs>
     <ds:schemaRef ds:uri="http://schemas.microsoft.com/office/2006/documentManagement/types"/>
@@ -11671,4 +11827,12 @@
     <ds:schemaRef ds:uri="http://schemas.microsoft.com/office/2006/metadata/properties"/>
   </ds:schemaRefs>
 </ds:datastoreItem>
+</file>
+
+<file path=customXml/itemProps3.xml><?xml version="1.0" encoding="utf-8"?>
+<ds:datastoreItem xmlns:ds="http://schemas.openxmlformats.org/officeDocument/2006/customXml" ds:itemID="{957E0BBE-38AF-4179-B401-F6E82B6A5F3D}">
+  <ds:schemaRefs>
+    <ds:schemaRef ds:uri="http://schemas.microsoft.com/sharepoint/v3/contenttype/forms"/>
+  </ds:schemaRefs>
+</ds:datastoreItem>
 </file>
</xml_diff>